<commit_message>
Two references added - PPT and Report
</commit_message>
<xml_diff>
--- a/presentation/Final_Term.pptx
+++ b/presentation/Final_Term.pptx
@@ -10917,7 +10917,7 @@
         </p:nvSpPr>
         <p:spPr>
           <a:xfrm>
-            <a:off x="311700" y="1229875"/>
+            <a:off x="311700" y="1017800"/>
             <a:ext cx="8520600" cy="3339000"/>
           </a:xfrm>
           <a:prstGeom prst="rect">
@@ -10932,142 +10932,126 @@
           <a:p>
             <a:pPr lvl="0"/>
             <a:r>
-              <a:rPr lang="en-US" sz="1300" dirty="0" err="1"/>
-              <a:t>Desheng</a:t>
-            </a:r>
-            <a:r>
-              <a:rPr lang="en-US" sz="1300" dirty="0"/>
+              <a:rPr lang="en-US" sz="1200" dirty="0" smtClean="0"/>
+              <a:t> Desheng</a:t>
+            </a:r>
+            <a:r>
+              <a:rPr lang="en-US" sz="1200" dirty="0"/>
               <a:t> Dash Wu, David L. Olson - Financial Risk Forecast Using Machine Learning and Sentiment Analysis</a:t>
             </a:r>
-            <a:endParaRPr lang="en-US" sz="1300" b="1" dirty="0"/>
+            <a:endParaRPr lang="en-US" sz="1200" b="1" dirty="0"/>
           </a:p>
           <a:p>
             <a:pPr lvl="0"/>
             <a:r>
-              <a:rPr lang="en-US" sz="1300" dirty="0" err="1"/>
-              <a:t>Sunandan</a:t>
-            </a:r>
-            <a:r>
-              <a:rPr lang="en-US" sz="1300" dirty="0"/>
-              <a:t> Chakraborty, </a:t>
-            </a:r>
-            <a:r>
-              <a:rPr lang="en-US" sz="1300" dirty="0" err="1"/>
-              <a:t>Ashwin</a:t>
-            </a:r>
-            <a:r>
-              <a:rPr lang="en-US" sz="1300" dirty="0"/>
-              <a:t> </a:t>
-            </a:r>
-            <a:r>
-              <a:rPr lang="en-US" sz="1300" dirty="0" err="1"/>
-              <a:t>Venkataraman</a:t>
-            </a:r>
-            <a:r>
-              <a:rPr lang="en-US" sz="1300" dirty="0"/>
-              <a:t>,   </a:t>
-            </a:r>
-            <a:r>
-              <a:rPr lang="en-US" sz="1300" dirty="0" err="1"/>
-              <a:t>Srikanth</a:t>
-            </a:r>
-            <a:r>
-              <a:rPr lang="en-US" sz="1300" dirty="0"/>
-              <a:t> </a:t>
-            </a:r>
-            <a:r>
-              <a:rPr lang="en-US" sz="1300" dirty="0" err="1"/>
-              <a:t>Jagabathula</a:t>
-            </a:r>
-            <a:r>
-              <a:rPr lang="en-US" sz="1300" dirty="0"/>
-              <a:t> and </a:t>
-            </a:r>
-            <a:r>
-              <a:rPr lang="en-US" sz="1300" dirty="0" err="1"/>
-              <a:t>Lakshminarayanan</a:t>
-            </a:r>
-            <a:r>
-              <a:rPr lang="en-US" sz="1300" dirty="0"/>
-              <a:t> Subramanian - Predicting Socio-Economic Indicators using News Events</a:t>
-            </a:r>
-            <a:endParaRPr lang="en-US" sz="1300" b="1" dirty="0"/>
+              <a:rPr lang="en-US" sz="1200" dirty="0" smtClean="0"/>
+              <a:t> Sunandan </a:t>
+            </a:r>
+            <a:r>
+              <a:rPr lang="en-US" sz="1200" dirty="0"/>
+              <a:t>Chakraborty, Ashwin Venkataraman,   Srikanth Jagabathula and Lakshminarayanan Subramanian - Predicting Socio-Economic Indicators using News Events</a:t>
+            </a:r>
+            <a:endParaRPr lang="en-US" sz="1200" b="1" dirty="0"/>
           </a:p>
           <a:p>
             <a:pPr lvl="0"/>
             <a:r>
-              <a:rPr lang="en-US" sz="1300" dirty="0" err="1"/>
-              <a:t>Chuan-Ju</a:t>
-            </a:r>
-            <a:r>
-              <a:rPr lang="en-US" sz="1300" dirty="0"/>
-              <a:t> Wang , Ming-Feng Tsai , </a:t>
-            </a:r>
-            <a:r>
-              <a:rPr lang="en-US" sz="1300" dirty="0" err="1"/>
-              <a:t>Tse</a:t>
-            </a:r>
-            <a:r>
-              <a:rPr lang="en-US" sz="1300" dirty="0"/>
-              <a:t> Liu , Chin-Ting Chang -  Financial Sentiment Analysis for Risk Prediction </a:t>
-            </a:r>
-            <a:endParaRPr lang="en-US" sz="1300" b="1" dirty="0"/>
+              <a:rPr lang="en-US" sz="1200" dirty="0" smtClean="0"/>
+              <a:t> Chuan-Ju </a:t>
+            </a:r>
+            <a:r>
+              <a:rPr lang="en-US" sz="1200" dirty="0"/>
+              <a:t>Wang , Ming-Feng Tsai , Tse Liu , Chin-Ting Chang -  Financial Sentiment Analysis for Risk Prediction </a:t>
+            </a:r>
+            <a:endParaRPr lang="en-US" sz="1200" b="1" dirty="0"/>
           </a:p>
           <a:p>
             <a:pPr lvl="0"/>
             <a:r>
-              <a:rPr lang="en-US" sz="1300" dirty="0" err="1"/>
-              <a:t>Jinjian</a:t>
-            </a:r>
-            <a:r>
-              <a:rPr lang="en-US" sz="1300" dirty="0"/>
-              <a:t> </a:t>
-            </a:r>
-            <a:r>
-              <a:rPr lang="en-US" sz="1300" dirty="0" err="1"/>
-              <a:t>Zhai</a:t>
-            </a:r>
-            <a:r>
-              <a:rPr lang="en-US" sz="1300" dirty="0"/>
-              <a:t>, Nicholas Cohen, </a:t>
-            </a:r>
-            <a:r>
-              <a:rPr lang="en-US" sz="1300" dirty="0" err="1"/>
-              <a:t>Anand</a:t>
-            </a:r>
-            <a:r>
-              <a:rPr lang="en-US" sz="1300" dirty="0"/>
-              <a:t> </a:t>
-            </a:r>
-            <a:r>
-              <a:rPr lang="en-US" sz="1300" dirty="0" err="1"/>
-              <a:t>Atreya</a:t>
-            </a:r>
-            <a:r>
-              <a:rPr lang="en-US" sz="1300" dirty="0"/>
-              <a:t> - Sentiment analysis of     news articles for financial signal prediction </a:t>
-            </a:r>
-            <a:endParaRPr lang="en-US" sz="1300" b="1" dirty="0"/>
+              <a:rPr lang="en-US" sz="1200" dirty="0" smtClean="0"/>
+              <a:t> Jinjian </a:t>
+            </a:r>
+            <a:r>
+              <a:rPr lang="en-US" sz="1200" dirty="0"/>
+              <a:t>Zhai, Nicholas Cohen, Anand Atreya - Sentiment analysis </a:t>
+            </a:r>
+            <a:r>
+              <a:rPr lang="en-US" sz="1200" dirty="0" smtClean="0"/>
+              <a:t>of </a:t>
+            </a:r>
+            <a:r>
+              <a:rPr lang="en-US" sz="1200" dirty="0"/>
+              <a:t>news articles for financial signal prediction </a:t>
+            </a:r>
+            <a:endParaRPr lang="en-US" sz="1200" b="1" dirty="0"/>
           </a:p>
           <a:p>
             <a:pPr lvl="0"/>
             <a:r>
-              <a:rPr lang="en-US" sz="1300" dirty="0" err="1"/>
-              <a:t>Huina</a:t>
-            </a:r>
-            <a:r>
-              <a:rPr lang="en-US" sz="1300" dirty="0"/>
-              <a:t> Mao, Scott Counts, Johan </a:t>
-            </a:r>
-            <a:r>
-              <a:rPr lang="en-US" sz="1300" dirty="0" err="1"/>
-              <a:t>Bollen</a:t>
-            </a:r>
-            <a:r>
-              <a:rPr lang="en-US" sz="1300" dirty="0"/>
-              <a:t> -  Predicting Financial Markets: Comparing Survey, News, Twitter and Search Engine Data      </a:t>
-            </a:r>
-            <a:endParaRPr lang="en-US" sz="1300" b="1" dirty="0"/>
+              <a:rPr lang="en-US" sz="1200" dirty="0" smtClean="0"/>
+              <a:t> Huina </a:t>
+            </a:r>
+            <a:r>
+              <a:rPr lang="en-US" sz="1200" dirty="0"/>
+              <a:t>Mao, Scott Counts, Johan Bollen -  Predicting Financial Markets: Comparing Survey, News, Twitter and Search Engine Data      </a:t>
+            </a:r>
+            <a:endParaRPr lang="en-US" sz="1200" dirty="0" smtClean="0"/>
+          </a:p>
+          <a:p>
+            <a:pPr lvl="0"/>
+            <a:r>
+              <a:rPr lang="en-US" sz="1200" dirty="0" smtClean="0"/>
+              <a:t> Ubale </a:t>
+            </a:r>
+            <a:r>
+              <a:rPr lang="en-US" sz="1200" dirty="0"/>
+              <a:t>Swati, Chilekar Pranali, Sonkamble Pragati - Sentiment Analysis of News Articles Using </a:t>
+            </a:r>
+            <a:r>
+              <a:rPr lang="en-US" sz="1200" dirty="0" smtClean="0"/>
+              <a:t/>
+            </a:r>
+            <a:br>
+              <a:rPr lang="en-US" sz="1200" dirty="0" smtClean="0"/>
+            </a:br>
+            <a:r>
+              <a:rPr lang="en-US" sz="1200" dirty="0" smtClean="0"/>
+              <a:t>   Machine </a:t>
+            </a:r>
+            <a:r>
+              <a:rPr lang="en-US" sz="1200" dirty="0"/>
+              <a:t>Learning Approach</a:t>
+            </a:r>
+          </a:p>
+          <a:p>
+            <a:pPr lvl="0"/>
+            <a:r>
+              <a:rPr lang="en-US" sz="1200" dirty="0" smtClean="0"/>
+              <a:t> Namrata </a:t>
+            </a:r>
+            <a:r>
+              <a:rPr lang="en-US" sz="1200" dirty="0"/>
+              <a:t>Godbole, Manjunath Srinivasaiah, Steven Skiena - Large-Scale Sentiment </a:t>
+            </a:r>
+            <a:r>
+              <a:rPr lang="en-US" sz="1200" dirty="0" smtClean="0"/>
+              <a:t/>
+            </a:r>
+            <a:br>
+              <a:rPr lang="en-US" sz="1200" dirty="0" smtClean="0"/>
+            </a:br>
+            <a:r>
+              <a:rPr lang="en-US" sz="1200" dirty="0" smtClean="0"/>
+              <a:t>   Analysis </a:t>
+            </a:r>
+            <a:r>
+              <a:rPr lang="en-US" sz="1200" dirty="0"/>
+              <a:t>for News and Blogs</a:t>
+            </a:r>
+          </a:p>
+          <a:p>
+            <a:pPr lvl="0"/>
+            <a:endParaRPr lang="en-US" sz="1200" b="1" dirty="0"/>
           </a:p>
           <a:p>
             <a:pPr lvl="0" rtl="0">
@@ -11076,7 +11060,7 @@
               </a:spcBef>
               <a:buNone/>
             </a:pPr>
-            <a:endParaRPr dirty="0"/>
+            <a:endParaRPr sz="1200" dirty="0"/>
           </a:p>
           <a:p>
             <a:pPr lvl="0" rtl="0">
@@ -11085,7 +11069,7 @@
               </a:spcBef>
               <a:buNone/>
             </a:pPr>
-            <a:endParaRPr dirty="0"/>
+            <a:endParaRPr sz="1200" dirty="0"/>
           </a:p>
         </p:txBody>
       </p:sp>

</xml_diff>

<commit_message>
Comments added - ML Code ready for Demo
</commit_message>
<xml_diff>
--- a/presentation/Final_Term.pptx
+++ b/presentation/Final_Term.pptx
@@ -40,21 +40,21 @@
   <p:notesSz cx="6858000" cy="9144000"/>
   <p:embeddedFontLst>
     <p:embeddedFont>
-      <p:font typeface="Raleway" panose="020B0604020202020204" charset="0"/>
+      <p:font typeface="Lato" panose="020B0604020202020204" charset="0"/>
       <p:regular r:id="rId30"/>
       <p:bold r:id="rId31"/>
       <p:italic r:id="rId32"/>
       <p:boldItalic r:id="rId33"/>
     </p:embeddedFont>
     <p:embeddedFont>
-      <p:font typeface="Lato" panose="020B0604020202020204" charset="0"/>
+      <p:font typeface="Roboto" panose="020B0604020202020204" charset="0"/>
       <p:regular r:id="rId34"/>
       <p:bold r:id="rId35"/>
       <p:italic r:id="rId36"/>
       <p:boldItalic r:id="rId37"/>
     </p:embeddedFont>
     <p:embeddedFont>
-      <p:font typeface="Roboto" panose="020B0604020202020204" charset="0"/>
+      <p:font typeface="Raleway" panose="020B0604020202020204" charset="0"/>
       <p:regular r:id="rId38"/>
       <p:bold r:id="rId39"/>
       <p:italic r:id="rId40"/>
@@ -9144,11 +9144,7 @@
             </a:r>
             <a:r>
               <a:rPr lang="en-US" sz="1400" dirty="0" smtClean="0"/>
-              <a:t>analysis. </a:t>
-            </a:r>
-            <a:r>
-              <a:rPr lang="en-US" sz="1400" dirty="0" smtClean="0"/>
-              <a:t>In </a:t>
+              <a:t>analysis. In </a:t>
             </a:r>
             <a:r>
               <a:rPr lang="en-US" sz="1400" dirty="0"/>
@@ -9310,11 +9306,7 @@
             </a:r>
             <a:r>
               <a:rPr lang="en-US" sz="1400" b="1" dirty="0" smtClean="0"/>
-              <a:t>a. Rule Based </a:t>
-            </a:r>
-            <a:r>
-              <a:rPr lang="en-US" sz="1400" b="1" dirty="0" smtClean="0"/>
-              <a:t>Classification: </a:t>
+              <a:t>a. Rule Based Classification: </a:t>
             </a:r>
             <a:r>
               <a:rPr lang="en-US" sz="1400" dirty="0"/>
@@ -9380,11 +9372,7 @@
             </a:r>
             <a:r>
               <a:rPr lang="en-US" sz="1400" b="1" dirty="0" smtClean="0"/>
-              <a:t>b. Support Vector </a:t>
-            </a:r>
-            <a:r>
-              <a:rPr lang="en-US" sz="1400" b="1" dirty="0" smtClean="0"/>
-              <a:t>Machines</a:t>
+              <a:t>b. Support Vector Machines</a:t>
             </a:r>
             <a:r>
               <a:rPr lang="en-US" sz="1400" dirty="0" smtClean="0"/>
@@ -9400,11 +9388,7 @@
             </a:r>
             <a:r>
               <a:rPr lang="en-US" sz="1400" dirty="0"/>
-              <a:t>SVM finds a </a:t>
-            </a:r>
-            <a:r>
-              <a:rPr lang="en-US" sz="1400" dirty="0"/>
-              <a:t> </a:t>
+              <a:t>SVM finds a  </a:t>
             </a:r>
             <a:r>
               <a:rPr lang="en-US" sz="1400" dirty="0" smtClean="0"/>

</xml_diff>